<commit_message>
any changes Paul may have made
</commit_message>
<xml_diff>
--- a/pregame/BayesIncentNoFB/InstructionsDoublingBayes_NoFB.pptx
+++ b/pregame/BayesIncentNoFB/InstructionsDoublingBayes_NoFB.pptx
@@ -1891,7 +1891,7 @@
                 </a:solidFill>
                 <a:latin typeface="Calibri"/>
               </a:rPr>
-              <a:t>10/23/2024</a:t>
+              <a:t>10/24/2024</a:t>
             </a:fld>
             <a:endParaRPr lang="en-US" sz="1200" b="0" strike="noStrike" spc="-1">
               <a:latin typeface="Times New Roman"/>
@@ -2461,13 +2461,180 @@
       </p:sp>
       <p:sp>
         <p:nvSpPr>
+          <p:cNvPr id="45" name="CustomShape 4"/>
+          <p:cNvSpPr/>
+          <p:nvPr/>
+        </p:nvSpPr>
+        <p:spPr>
+          <a:xfrm>
+            <a:off x="5745613" y="354658"/>
+            <a:ext cx="1812600" cy="327240"/>
+          </a:xfrm>
+          <a:prstGeom prst="borderCallout2">
+            <a:avLst>
+              <a:gd name="adj1" fmla="val 70596"/>
+              <a:gd name="adj2" fmla="val 104027"/>
+              <a:gd name="adj3" fmla="val 50655"/>
+              <a:gd name="adj4" fmla="val 100059"/>
+              <a:gd name="adj5" fmla="val 118861"/>
+              <a:gd name="adj6" fmla="val 119980"/>
+            </a:avLst>
+          </a:prstGeom>
+          <a:ln/>
+        </p:spPr>
+        <p:style>
+          <a:lnRef idx="2">
+            <a:schemeClr val="accent1">
+              <a:shade val="50000"/>
+            </a:schemeClr>
+          </a:lnRef>
+          <a:fillRef idx="1">
+            <a:schemeClr val="accent1"/>
+          </a:fillRef>
+          <a:effectRef idx="0">
+            <a:schemeClr val="accent1"/>
+          </a:effectRef>
+          <a:fontRef idx="minor"/>
+        </p:style>
+        <p:txBody>
+          <a:bodyPr lIns="90000" tIns="45000" rIns="90000" bIns="45000" anchor="ctr">
+            <a:noAutofit/>
+          </a:bodyPr>
+          <a:lstStyle/>
+          <a:p>
+            <a:pPr algn="ctr">
+              <a:lnSpc>
+                <a:spcPct val="100000"/>
+              </a:lnSpc>
+            </a:pPr>
+            <a:r>
+              <a:rPr lang="en-US" sz="1800" b="0" strike="noStrike" spc="-1" dirty="0">
+                <a:solidFill>
+                  <a:srgbClr val="FFFFFF"/>
+                </a:solidFill>
+                <a:latin typeface="Calibri"/>
+              </a:rPr>
+              <a:t>(1) Rule Number</a:t>
+            </a:r>
+            <a:endParaRPr lang="en-US" sz="1800" b="0" strike="noStrike" spc="-1" dirty="0">
+              <a:latin typeface="Arial"/>
+            </a:endParaRPr>
+          </a:p>
+        </p:txBody>
+      </p:sp>
+      <p:sp>
+        <p:nvSpPr>
+          <p:cNvPr id="2" name="Rectangle 1">
+            <a:extLst>
+              <a:ext uri="{FF2B5EF4-FFF2-40B4-BE49-F238E27FC236}">
+                <a16:creationId xmlns:a16="http://schemas.microsoft.com/office/drawing/2014/main" id="{A1E6E13D-B017-97D3-E4A7-43AE33E57A5D}"/>
+              </a:ext>
+            </a:extLst>
+          </p:cNvPr>
+          <p:cNvSpPr/>
+          <p:nvPr/>
+        </p:nvSpPr>
+        <p:spPr>
+          <a:xfrm>
+            <a:off x="5745613" y="1175657"/>
+            <a:ext cx="702688" cy="5137681"/>
+          </a:xfrm>
+          <a:prstGeom prst="rect">
+            <a:avLst/>
+          </a:prstGeom>
+          <a:solidFill>
+            <a:schemeClr val="bg1"/>
+          </a:solidFill>
+          <a:ln>
+            <a:noFill/>
+          </a:ln>
+        </p:spPr>
+        <p:style>
+          <a:lnRef idx="2">
+            <a:schemeClr val="accent1">
+              <a:shade val="15000"/>
+            </a:schemeClr>
+          </a:lnRef>
+          <a:fillRef idx="1">
+            <a:schemeClr val="accent1"/>
+          </a:fillRef>
+          <a:effectRef idx="0">
+            <a:schemeClr val="accent1"/>
+          </a:effectRef>
+          <a:fontRef idx="minor">
+            <a:schemeClr val="lt1"/>
+          </a:fontRef>
+        </p:style>
+        <p:txBody>
+          <a:bodyPr rtlCol="0" anchor="ctr"/>
+          <a:lstStyle/>
+          <a:p>
+            <a:pPr algn="ctr"/>
+            <a:endParaRPr lang="en-US"/>
+          </a:p>
+        </p:txBody>
+      </p:sp>
+      <p:sp>
+        <p:nvSpPr>
+          <p:cNvPr id="3" name="Rectangle 2">
+            <a:extLst>
+              <a:ext uri="{FF2B5EF4-FFF2-40B4-BE49-F238E27FC236}">
+                <a16:creationId xmlns:a16="http://schemas.microsoft.com/office/drawing/2014/main" id="{FAD2CFD9-D299-B848-3DB0-D52FF6E6811F}"/>
+              </a:ext>
+            </a:extLst>
+          </p:cNvPr>
+          <p:cNvSpPr/>
+          <p:nvPr/>
+        </p:nvSpPr>
+        <p:spPr>
+          <a:xfrm>
+            <a:off x="10500493" y="1114697"/>
+            <a:ext cx="702688" cy="5137681"/>
+          </a:xfrm>
+          <a:prstGeom prst="rect">
+            <a:avLst/>
+          </a:prstGeom>
+          <a:solidFill>
+            <a:schemeClr val="bg1"/>
+          </a:solidFill>
+          <a:ln>
+            <a:noFill/>
+          </a:ln>
+        </p:spPr>
+        <p:style>
+          <a:lnRef idx="2">
+            <a:schemeClr val="accent1">
+              <a:shade val="15000"/>
+            </a:schemeClr>
+          </a:lnRef>
+          <a:fillRef idx="1">
+            <a:schemeClr val="accent1"/>
+          </a:fillRef>
+          <a:effectRef idx="0">
+            <a:schemeClr val="accent1"/>
+          </a:effectRef>
+          <a:fontRef idx="minor">
+            <a:schemeClr val="lt1"/>
+          </a:fontRef>
+        </p:style>
+        <p:txBody>
+          <a:bodyPr rtlCol="0" anchor="ctr"/>
+          <a:lstStyle/>
+          <a:p>
+            <a:pPr algn="ctr"/>
+            <a:endParaRPr lang="en-US"/>
+          </a:p>
+        </p:txBody>
+      </p:sp>
+      <p:sp>
+        <p:nvSpPr>
           <p:cNvPr id="44" name="CustomShape 3"/>
           <p:cNvSpPr/>
           <p:nvPr/>
         </p:nvSpPr>
         <p:spPr>
           <a:xfrm>
-            <a:off x="10577243" y="544662"/>
+            <a:off x="10851837" y="3221146"/>
             <a:ext cx="1255320" cy="327240"/>
           </a:xfrm>
           <a:prstGeom prst="borderCallout2">
@@ -2519,173 +2686,6 @@
             <a:endParaRPr lang="en-US" sz="1800" b="0" strike="noStrike" spc="-1" dirty="0">
               <a:latin typeface="Arial"/>
             </a:endParaRPr>
-          </a:p>
-        </p:txBody>
-      </p:sp>
-      <p:sp>
-        <p:nvSpPr>
-          <p:cNvPr id="45" name="CustomShape 4"/>
-          <p:cNvSpPr/>
-          <p:nvPr/>
-        </p:nvSpPr>
-        <p:spPr>
-          <a:xfrm>
-            <a:off x="5745613" y="354658"/>
-            <a:ext cx="1812600" cy="327240"/>
-          </a:xfrm>
-          <a:prstGeom prst="borderCallout2">
-            <a:avLst>
-              <a:gd name="adj1" fmla="val 70596"/>
-              <a:gd name="adj2" fmla="val 104027"/>
-              <a:gd name="adj3" fmla="val 50655"/>
-              <a:gd name="adj4" fmla="val 100059"/>
-              <a:gd name="adj5" fmla="val 118861"/>
-              <a:gd name="adj6" fmla="val 119980"/>
-            </a:avLst>
-          </a:prstGeom>
-          <a:ln/>
-        </p:spPr>
-        <p:style>
-          <a:lnRef idx="2">
-            <a:schemeClr val="accent1">
-              <a:shade val="50000"/>
-            </a:schemeClr>
-          </a:lnRef>
-          <a:fillRef idx="1">
-            <a:schemeClr val="accent1"/>
-          </a:fillRef>
-          <a:effectRef idx="0">
-            <a:schemeClr val="accent1"/>
-          </a:effectRef>
-          <a:fontRef idx="minor"/>
-        </p:style>
-        <p:txBody>
-          <a:bodyPr lIns="90000" tIns="45000" rIns="90000" bIns="45000" anchor="ctr">
-            <a:noAutofit/>
-          </a:bodyPr>
-          <a:lstStyle/>
-          <a:p>
-            <a:pPr algn="ctr">
-              <a:lnSpc>
-                <a:spcPct val="100000"/>
-              </a:lnSpc>
-            </a:pPr>
-            <a:r>
-              <a:rPr lang="en-US" sz="1800" b="0" strike="noStrike" spc="-1" dirty="0">
-                <a:solidFill>
-                  <a:srgbClr val="FFFFFF"/>
-                </a:solidFill>
-                <a:latin typeface="Calibri"/>
-              </a:rPr>
-              <a:t>(1) Rule Number</a:t>
-            </a:r>
-            <a:endParaRPr lang="en-US" sz="1800" b="0" strike="noStrike" spc="-1" dirty="0">
-              <a:latin typeface="Arial"/>
-            </a:endParaRPr>
-          </a:p>
-        </p:txBody>
-      </p:sp>
-      <p:sp>
-        <p:nvSpPr>
-          <p:cNvPr id="2" name="Rectangle 1">
-            <a:extLst>
-              <a:ext uri="{FF2B5EF4-FFF2-40B4-BE49-F238E27FC236}">
-                <a16:creationId xmlns:a16="http://schemas.microsoft.com/office/drawing/2014/main" id="{A1E6E13D-B017-97D3-E4A7-43AE33E57A5D}"/>
-              </a:ext>
-            </a:extLst>
-          </p:cNvPr>
-          <p:cNvSpPr/>
-          <p:nvPr/>
-        </p:nvSpPr>
-        <p:spPr>
-          <a:xfrm>
-            <a:off x="5745613" y="1175657"/>
-            <a:ext cx="702688" cy="5137681"/>
-          </a:xfrm>
-          <a:prstGeom prst="rect">
-            <a:avLst/>
-          </a:prstGeom>
-          <a:solidFill>
-            <a:schemeClr val="bg1"/>
-          </a:solidFill>
-          <a:ln>
-            <a:noFill/>
-          </a:ln>
-        </p:spPr>
-        <p:style>
-          <a:lnRef idx="2">
-            <a:schemeClr val="accent1">
-              <a:shade val="15000"/>
-            </a:schemeClr>
-          </a:lnRef>
-          <a:fillRef idx="1">
-            <a:schemeClr val="accent1"/>
-          </a:fillRef>
-          <a:effectRef idx="0">
-            <a:schemeClr val="accent1"/>
-          </a:effectRef>
-          <a:fontRef idx="minor">
-            <a:schemeClr val="lt1"/>
-          </a:fontRef>
-        </p:style>
-        <p:txBody>
-          <a:bodyPr rtlCol="0" anchor="ctr"/>
-          <a:lstStyle/>
-          <a:p>
-            <a:pPr algn="ctr"/>
-            <a:endParaRPr lang="en-US"/>
-          </a:p>
-        </p:txBody>
-      </p:sp>
-      <p:sp>
-        <p:nvSpPr>
-          <p:cNvPr id="3" name="Rectangle 2">
-            <a:extLst>
-              <a:ext uri="{FF2B5EF4-FFF2-40B4-BE49-F238E27FC236}">
-                <a16:creationId xmlns:a16="http://schemas.microsoft.com/office/drawing/2014/main" id="{FAD2CFD9-D299-B848-3DB0-D52FF6E6811F}"/>
-              </a:ext>
-            </a:extLst>
-          </p:cNvPr>
-          <p:cNvSpPr/>
-          <p:nvPr/>
-        </p:nvSpPr>
-        <p:spPr>
-          <a:xfrm>
-            <a:off x="10500493" y="1114697"/>
-            <a:ext cx="702688" cy="5137681"/>
-          </a:xfrm>
-          <a:prstGeom prst="rect">
-            <a:avLst/>
-          </a:prstGeom>
-          <a:solidFill>
-            <a:schemeClr val="bg1"/>
-          </a:solidFill>
-          <a:ln>
-            <a:noFill/>
-          </a:ln>
-        </p:spPr>
-        <p:style>
-          <a:lnRef idx="2">
-            <a:schemeClr val="accent1">
-              <a:shade val="15000"/>
-            </a:schemeClr>
-          </a:lnRef>
-          <a:fillRef idx="1">
-            <a:schemeClr val="accent1"/>
-          </a:fillRef>
-          <a:effectRef idx="0">
-            <a:schemeClr val="accent1"/>
-          </a:effectRef>
-          <a:fontRef idx="minor">
-            <a:schemeClr val="lt1"/>
-          </a:fontRef>
-        </p:style>
-        <p:txBody>
-          <a:bodyPr rtlCol="0" anchor="ctr"/>
-          <a:lstStyle/>
-          <a:p>
-            <a:pPr algn="ctr"/>
-            <a:endParaRPr lang="en-US"/>
           </a:p>
         </p:txBody>
       </p:sp>
@@ -3523,10 +3523,10 @@
       </p:sp>
       <p:sp>
         <p:nvSpPr>
-          <p:cNvPr id="4" name="Rectangle 3">
+          <p:cNvPr id="7" name="Rectangle 6">
             <a:extLst>
               <a:ext uri="{FF2B5EF4-FFF2-40B4-BE49-F238E27FC236}">
-                <a16:creationId xmlns:a16="http://schemas.microsoft.com/office/drawing/2014/main" id="{F874A228-3A1A-C153-B0A2-F925A9E7ABEB}"/>
+                <a16:creationId xmlns:a16="http://schemas.microsoft.com/office/drawing/2014/main" id="{77E93B63-3F11-460C-9EBA-23D8B25E8427}"/>
               </a:ext>
             </a:extLst>
           </p:cNvPr>
@@ -3535,12 +3535,18 @@
         </p:nvSpPr>
         <p:spPr>
           <a:xfrm>
-            <a:off x="1200150" y="5857868"/>
-            <a:ext cx="10086975" cy="514350"/>
-          </a:xfrm>
-          <a:prstGeom prst="rect">
-            <a:avLst/>
-          </a:prstGeom>
+            <a:off x="6780810" y="1339778"/>
+            <a:ext cx="1139792" cy="405895"/>
+          </a:xfrm>
+          <a:prstGeom prst="rect">
+            <a:avLst/>
+          </a:prstGeom>
+          <a:solidFill>
+            <a:schemeClr val="bg1"/>
+          </a:solidFill>
+          <a:ln>
+            <a:noFill/>
+          </a:ln>
         </p:spPr>
         <p:style>
           <a:lnRef idx="2">
@@ -3563,26 +3569,16 @@
           <a:lstStyle/>
           <a:p>
             <a:pPr algn="ctr"/>
-            <a:r>
-              <a:rPr lang="en-US"/>
-              <a:t>Remember: You can only drop pieces into the buckets. NOT into the test tubes. </a:t>
-            </a:r>
-            <a:r>
-              <a:rPr lang="en-US">
-                <a:sym typeface="Wingdings" panose="05000000000000000000" pitchFamily="2" charset="2"/>
-              </a:rPr>
-              <a:t> </a:t>
-            </a:r>
             <a:endParaRPr lang="en-US"/>
           </a:p>
         </p:txBody>
       </p:sp>
       <p:sp>
         <p:nvSpPr>
-          <p:cNvPr id="7" name="Rectangle 6">
+          <p:cNvPr id="5" name="Rectangle 4">
             <a:extLst>
               <a:ext uri="{FF2B5EF4-FFF2-40B4-BE49-F238E27FC236}">
-                <a16:creationId xmlns:a16="http://schemas.microsoft.com/office/drawing/2014/main" id="{77E93B63-3F11-460C-9EBA-23D8B25E8427}"/>
+                <a16:creationId xmlns:a16="http://schemas.microsoft.com/office/drawing/2014/main" id="{99E9422E-BB60-5CDB-C23A-8A1F2181BD13}"/>
               </a:ext>
             </a:extLst>
           </p:cNvPr>
@@ -3591,8 +3587,60 @@
         </p:nvSpPr>
         <p:spPr>
           <a:xfrm>
-            <a:off x="6780810" y="1339778"/>
-            <a:ext cx="1139792" cy="405895"/>
+            <a:off x="5139973" y="1448790"/>
+            <a:ext cx="702688" cy="2671948"/>
+          </a:xfrm>
+          <a:prstGeom prst="rect">
+            <a:avLst/>
+          </a:prstGeom>
+          <a:solidFill>
+            <a:schemeClr val="bg1"/>
+          </a:solidFill>
+          <a:ln>
+            <a:noFill/>
+          </a:ln>
+        </p:spPr>
+        <p:style>
+          <a:lnRef idx="2">
+            <a:schemeClr val="accent1">
+              <a:shade val="15000"/>
+            </a:schemeClr>
+          </a:lnRef>
+          <a:fillRef idx="1">
+            <a:schemeClr val="accent1"/>
+          </a:fillRef>
+          <a:effectRef idx="0">
+            <a:schemeClr val="accent1"/>
+          </a:effectRef>
+          <a:fontRef idx="minor">
+            <a:schemeClr val="lt1"/>
+          </a:fontRef>
+        </p:style>
+        <p:txBody>
+          <a:bodyPr rtlCol="0" anchor="ctr"/>
+          <a:lstStyle/>
+          <a:p>
+            <a:pPr algn="ctr"/>
+            <a:endParaRPr lang="en-US"/>
+          </a:p>
+        </p:txBody>
+      </p:sp>
+      <p:sp>
+        <p:nvSpPr>
+          <p:cNvPr id="8" name="Rectangle 7">
+            <a:extLst>
+              <a:ext uri="{FF2B5EF4-FFF2-40B4-BE49-F238E27FC236}">
+                <a16:creationId xmlns:a16="http://schemas.microsoft.com/office/drawing/2014/main" id="{A59401E5-A638-C371-CD11-88C6929A7862}"/>
+              </a:ext>
+            </a:extLst>
+          </p:cNvPr>
+          <p:cNvSpPr/>
+          <p:nvPr/>
+        </p:nvSpPr>
+        <p:spPr>
+          <a:xfrm>
+            <a:off x="8902470" y="1626918"/>
+            <a:ext cx="702688" cy="2422567"/>
           </a:xfrm>
           <a:prstGeom prst="rect">
             <a:avLst/>

</xml_diff>